<commit_message>
Incorporated logo to page
</commit_message>
<xml_diff>
--- a/assets/images/hangman_logo.pptx
+++ b/assets/images/hangman_logo.pptx
@@ -5,9 +5,9 @@
     <p:sldMasterId id="2147483648" r:id="rId1"/>
   </p:sldMasterIdLst>
   <p:sldIdLst>
-    <p:sldId id="256" r:id="rId2"/>
-    <p:sldId id="258" r:id="rId3"/>
-    <p:sldId id="259" r:id="rId4"/>
+    <p:sldId id="258" r:id="rId2"/>
+    <p:sldId id="259" r:id="rId3"/>
+    <p:sldId id="256" r:id="rId4"/>
     <p:sldId id="257" r:id="rId5"/>
   </p:sldIdLst>
   <p:sldSz cx="9144000" cy="6858000" type="screen4x3"/>
@@ -3084,6 +3084,1170 @@
 <file path=ppt/slides/slide1.xml><?xml version="1.0" encoding="utf-8"?>
 <p:sld xmlns:a="http://schemas.openxmlformats.org/drawingml/2006/main" xmlns:r="http://schemas.openxmlformats.org/officeDocument/2006/relationships" xmlns:p="http://schemas.openxmlformats.org/presentationml/2006/main">
   <p:cSld>
+    <p:bg>
+      <p:bgPr>
+        <a:solidFill>
+          <a:srgbClr val="C4C4BD"/>
+        </a:solidFill>
+        <a:effectLst/>
+      </p:bgPr>
+    </p:bg>
+    <p:spTree>
+      <p:nvGrpSpPr>
+        <p:cNvPr id="1" name=""/>
+        <p:cNvGrpSpPr/>
+        <p:nvPr/>
+      </p:nvGrpSpPr>
+      <p:grpSpPr>
+        <a:xfrm>
+          <a:off x="0" y="0"/>
+          <a:ext cx="0" cy="0"/>
+          <a:chOff x="0" y="0"/>
+          <a:chExt cx="0" cy="0"/>
+        </a:xfrm>
+      </p:grpSpPr>
+      <p:sp>
+        <p:nvSpPr>
+          <p:cNvPr id="16" name="12-Point Star 15"/>
+          <p:cNvSpPr/>
+          <p:nvPr/>
+        </p:nvSpPr>
+        <p:spPr>
+          <a:xfrm>
+            <a:off x="2287570" y="2060942"/>
+            <a:ext cx="3810000" cy="2057400"/>
+          </a:xfrm>
+          <a:prstGeom prst="star12">
+            <a:avLst>
+              <a:gd name="adj" fmla="val 40119"/>
+            </a:avLst>
+          </a:prstGeom>
+          <a:solidFill>
+            <a:srgbClr val="007A37"/>
+          </a:solidFill>
+          <a:ln w="12700"/>
+          <a:scene3d>
+            <a:camera prst="orthographicFront"/>
+            <a:lightRig rig="threePt" dir="t"/>
+          </a:scene3d>
+          <a:sp3d>
+            <a:bevelT w="139700" h="139700" prst="divot"/>
+          </a:sp3d>
+        </p:spPr>
+        <p:style>
+          <a:lnRef idx="2">
+            <a:schemeClr val="accent3">
+              <a:shade val="50000"/>
+            </a:schemeClr>
+          </a:lnRef>
+          <a:fillRef idx="1">
+            <a:schemeClr val="accent3"/>
+          </a:fillRef>
+          <a:effectRef idx="0">
+            <a:schemeClr val="accent3"/>
+          </a:effectRef>
+          <a:fontRef idx="minor">
+            <a:schemeClr val="lt1"/>
+          </a:fontRef>
+        </p:style>
+        <p:txBody>
+          <a:bodyPr rtlCol="0" anchor="ctr"/>
+          <a:lstStyle/>
+          <a:p>
+            <a:pPr algn="ctr"/>
+            <a:endParaRPr lang="en-US"/>
+          </a:p>
+        </p:txBody>
+      </p:sp>
+      <p:sp>
+        <p:nvSpPr>
+          <p:cNvPr id="17" name="12-Point Star 16"/>
+          <p:cNvSpPr/>
+          <p:nvPr/>
+        </p:nvSpPr>
+        <p:spPr>
+          <a:xfrm>
+            <a:off x="2439970" y="2157740"/>
+            <a:ext cx="3505200" cy="1920240"/>
+          </a:xfrm>
+          <a:prstGeom prst="star12">
+            <a:avLst>
+              <a:gd name="adj" fmla="val 40119"/>
+            </a:avLst>
+          </a:prstGeom>
+          <a:solidFill>
+            <a:srgbClr val="00B050"/>
+          </a:solidFill>
+          <a:ln w="12700"/>
+          <a:scene3d>
+            <a:camera prst="orthographicFront"/>
+            <a:lightRig rig="threePt" dir="t"/>
+          </a:scene3d>
+          <a:sp3d>
+            <a:bevelT w="139700" h="139700" prst="divot"/>
+          </a:sp3d>
+        </p:spPr>
+        <p:style>
+          <a:lnRef idx="2">
+            <a:schemeClr val="accent3">
+              <a:shade val="50000"/>
+            </a:schemeClr>
+          </a:lnRef>
+          <a:fillRef idx="1">
+            <a:schemeClr val="accent3"/>
+          </a:fillRef>
+          <a:effectRef idx="0">
+            <a:schemeClr val="accent3"/>
+          </a:effectRef>
+          <a:fontRef idx="minor">
+            <a:schemeClr val="lt1"/>
+          </a:fontRef>
+        </p:style>
+        <p:txBody>
+          <a:bodyPr rtlCol="0" anchor="ctr"/>
+          <a:lstStyle/>
+          <a:p>
+            <a:pPr algn="ctr"/>
+            <a:endParaRPr lang="en-US"/>
+          </a:p>
+        </p:txBody>
+      </p:sp>
+      <p:grpSp>
+        <p:nvGrpSpPr>
+          <p:cNvPr id="24" name="Group 23"/>
+          <p:cNvGrpSpPr/>
+          <p:nvPr/>
+        </p:nvGrpSpPr>
+        <p:grpSpPr>
+          <a:xfrm>
+            <a:off x="2897183" y="2441942"/>
+            <a:ext cx="2590774" cy="1261674"/>
+            <a:chOff x="990600" y="2366854"/>
+            <a:chExt cx="2590774" cy="1261674"/>
+          </a:xfrm>
+        </p:grpSpPr>
+        <p:sp>
+          <p:nvSpPr>
+            <p:cNvPr id="11" name="TextBox 10"/>
+            <p:cNvSpPr txBox="1"/>
+            <p:nvPr/>
+          </p:nvSpPr>
+          <p:spPr>
+            <a:xfrm>
+              <a:off x="1383336" y="3105308"/>
+              <a:ext cx="1805302" cy="523220"/>
+            </a:xfrm>
+            <a:prstGeom prst="rect">
+              <a:avLst/>
+            </a:prstGeom>
+            <a:noFill/>
+          </p:spPr>
+          <p:txBody>
+            <a:bodyPr wrap="none" rtlCol="0">
+              <a:spAutoFit/>
+            </a:bodyPr>
+            <a:lstStyle/>
+            <a:p>
+              <a:pPr algn="ctr"/>
+              <a:r>
+                <a:rPr lang="en-US" sz="2800" dirty="0" smtClean="0">
+                  <a:ln w="6350">
+                    <a:solidFill>
+                      <a:schemeClr val="accent2">
+                        <a:lumMod val="50000"/>
+                      </a:schemeClr>
+                    </a:solidFill>
+                  </a:ln>
+                  <a:solidFill>
+                    <a:srgbClr val="FF0000"/>
+                  </a:solidFill>
+                  <a:effectLst>
+                    <a:glow rad="228600">
+                      <a:schemeClr val="accent3">
+                        <a:satMod val="175000"/>
+                        <a:alpha val="40000"/>
+                      </a:schemeClr>
+                    </a:glow>
+                  </a:effectLst>
+                  <a:latin typeface="Octin Vintage B Rg" panose="02000506020000020004" pitchFamily="2" charset="0"/>
+                </a:rPr>
+                <a:t>HANGMAN</a:t>
+              </a:r>
+            </a:p>
+          </p:txBody>
+        </p:sp>
+        <p:sp>
+          <p:nvSpPr>
+            <p:cNvPr id="4" name="TextBox 3"/>
+            <p:cNvSpPr txBox="1"/>
+            <p:nvPr/>
+          </p:nvSpPr>
+          <p:spPr>
+            <a:xfrm>
+              <a:off x="990600" y="2366854"/>
+              <a:ext cx="2590774" cy="1015663"/>
+            </a:xfrm>
+            <a:prstGeom prst="rect">
+              <a:avLst/>
+            </a:prstGeom>
+            <a:noFill/>
+          </p:spPr>
+          <p:txBody>
+            <a:bodyPr wrap="none" rtlCol="0">
+              <a:spAutoFit/>
+              <a:scene3d>
+                <a:camera prst="orthographicFront"/>
+                <a:lightRig rig="threePt" dir="t"/>
+              </a:scene3d>
+              <a:sp3d extrusionH="57150">
+                <a:bevelT w="38100" h="38100" prst="slope"/>
+              </a:sp3d>
+            </a:bodyPr>
+            <a:lstStyle/>
+            <a:p>
+              <a:pPr algn="ctr"/>
+              <a:r>
+                <a:rPr lang="en-US" sz="6000" dirty="0" smtClean="0">
+                  <a:ln w="9525">
+                    <a:solidFill>
+                      <a:schemeClr val="tx1"/>
+                    </a:solidFill>
+                  </a:ln>
+                  <a:solidFill>
+                    <a:schemeClr val="bg1"/>
+                  </a:solidFill>
+                  <a:effectLst>
+                    <a:glow rad="139700">
+                      <a:schemeClr val="accent3">
+                        <a:satMod val="175000"/>
+                        <a:alpha val="40000"/>
+                      </a:schemeClr>
+                    </a:glow>
+                    <a:innerShdw blurRad="63500" dist="50800" dir="10800000">
+                      <a:prstClr val="black">
+                        <a:alpha val="50000"/>
+                      </a:prstClr>
+                    </a:innerShdw>
+                  </a:effectLst>
+                  <a:latin typeface="Fight Night" panose="02000500000000000000" pitchFamily="2" charset="0"/>
+                </a:rPr>
+                <a:t>SOCCER</a:t>
+              </a:r>
+            </a:p>
+          </p:txBody>
+        </p:sp>
+      </p:grpSp>
+      <p:sp>
+        <p:nvSpPr>
+          <p:cNvPr id="2" name="Isosceles Triangle 1"/>
+          <p:cNvSpPr/>
+          <p:nvPr/>
+        </p:nvSpPr>
+        <p:spPr>
+          <a:xfrm rot="16200000">
+            <a:off x="2567008" y="2908309"/>
+            <a:ext cx="123782" cy="381001"/>
+          </a:xfrm>
+          <a:prstGeom prst="triangle">
+            <a:avLst/>
+          </a:prstGeom>
+          <a:solidFill>
+            <a:srgbClr val="FFFF00"/>
+          </a:solidFill>
+          <a:ln w="12700">
+            <a:noFill/>
+          </a:ln>
+          <a:scene3d>
+            <a:camera prst="orthographicFront"/>
+            <a:lightRig rig="threePt" dir="t"/>
+          </a:scene3d>
+          <a:sp3d>
+            <a:bevelT prst="angle"/>
+          </a:sp3d>
+        </p:spPr>
+        <p:style>
+          <a:lnRef idx="2">
+            <a:schemeClr val="accent1">
+              <a:shade val="50000"/>
+            </a:schemeClr>
+          </a:lnRef>
+          <a:fillRef idx="1">
+            <a:schemeClr val="accent1"/>
+          </a:fillRef>
+          <a:effectRef idx="0">
+            <a:schemeClr val="accent1"/>
+          </a:effectRef>
+          <a:fontRef idx="minor">
+            <a:schemeClr val="lt1"/>
+          </a:fontRef>
+        </p:style>
+        <p:txBody>
+          <a:bodyPr rtlCol="0" anchor="ctr"/>
+          <a:lstStyle/>
+          <a:p>
+            <a:pPr algn="ctr"/>
+            <a:endParaRPr lang="en-US"/>
+          </a:p>
+        </p:txBody>
+      </p:sp>
+      <p:sp>
+        <p:nvSpPr>
+          <p:cNvPr id="9" name="Isosceles Triangle 8"/>
+          <p:cNvSpPr/>
+          <p:nvPr/>
+        </p:nvSpPr>
+        <p:spPr>
+          <a:xfrm rot="5400000" flipH="1">
+            <a:off x="5691210" y="2903883"/>
+            <a:ext cx="123782" cy="381001"/>
+          </a:xfrm>
+          <a:prstGeom prst="triangle">
+            <a:avLst/>
+          </a:prstGeom>
+          <a:solidFill>
+            <a:srgbClr val="FFFF00"/>
+          </a:solidFill>
+          <a:ln w="12700">
+            <a:noFill/>
+          </a:ln>
+          <a:scene3d>
+            <a:camera prst="orthographicFront"/>
+            <a:lightRig rig="threePt" dir="t"/>
+          </a:scene3d>
+          <a:sp3d>
+            <a:bevelT prst="angle"/>
+          </a:sp3d>
+        </p:spPr>
+        <p:style>
+          <a:lnRef idx="2">
+            <a:schemeClr val="accent1">
+              <a:shade val="50000"/>
+            </a:schemeClr>
+          </a:lnRef>
+          <a:fillRef idx="1">
+            <a:schemeClr val="accent1"/>
+          </a:fillRef>
+          <a:effectRef idx="0">
+            <a:schemeClr val="accent1"/>
+          </a:effectRef>
+          <a:fontRef idx="minor">
+            <a:schemeClr val="lt1"/>
+          </a:fontRef>
+        </p:style>
+        <p:txBody>
+          <a:bodyPr rtlCol="0" anchor="ctr"/>
+          <a:lstStyle/>
+          <a:p>
+            <a:pPr algn="ctr"/>
+            <a:endParaRPr lang="en-US"/>
+          </a:p>
+        </p:txBody>
+      </p:sp>
+      <p:sp>
+        <p:nvSpPr>
+          <p:cNvPr id="3" name="TextBox 2"/>
+          <p:cNvSpPr txBox="1"/>
+          <p:nvPr/>
+        </p:nvSpPr>
+        <p:spPr>
+          <a:xfrm>
+            <a:off x="3387404" y="1038225"/>
+            <a:ext cx="1641796" cy="1569660"/>
+          </a:xfrm>
+          <a:prstGeom prst="rect">
+            <a:avLst/>
+          </a:prstGeom>
+          <a:noFill/>
+        </p:spPr>
+        <p:txBody>
+          <a:bodyPr wrap="none" rtlCol="0">
+            <a:spAutoFit/>
+            <a:scene3d>
+              <a:camera prst="orthographicFront"/>
+              <a:lightRig rig="threePt" dir="t"/>
+            </a:scene3d>
+            <a:sp3d extrusionH="57150">
+              <a:bevelT w="38100" h="38100" prst="angle"/>
+            </a:sp3d>
+          </a:bodyPr>
+          <a:lstStyle/>
+          <a:p>
+            <a:r>
+              <a:rPr lang="en-US" sz="9600" dirty="0" smtClean="0">
+                <a:ln>
+                  <a:solidFill>
+                    <a:schemeClr val="tx1"/>
+                  </a:solidFill>
+                </a:ln>
+                <a:solidFill>
+                  <a:schemeClr val="tx1">
+                    <a:lumMod val="75000"/>
+                    <a:lumOff val="25000"/>
+                  </a:schemeClr>
+                </a:solidFill>
+                <a:latin typeface="Sport 4 Ever" pitchFamily="2" charset="0"/>
+              </a:rPr>
+              <a:t>F</a:t>
+            </a:r>
+            <a:endParaRPr lang="en-US" sz="9600" dirty="0">
+              <a:ln>
+                <a:solidFill>
+                  <a:schemeClr val="tx1"/>
+                </a:solidFill>
+              </a:ln>
+              <a:solidFill>
+                <a:schemeClr val="tx1">
+                  <a:lumMod val="75000"/>
+                  <a:lumOff val="25000"/>
+                </a:schemeClr>
+              </a:solidFill>
+              <a:latin typeface="Sport 4 Ever" pitchFamily="2" charset="0"/>
+            </a:endParaRPr>
+          </a:p>
+        </p:txBody>
+      </p:sp>
+      <p:sp>
+        <p:nvSpPr>
+          <p:cNvPr id="10" name="TextBox 9"/>
+          <p:cNvSpPr txBox="1"/>
+          <p:nvPr/>
+        </p:nvSpPr>
+        <p:spPr>
+          <a:xfrm>
+            <a:off x="2743200" y="1600200"/>
+            <a:ext cx="830677" cy="1200329"/>
+          </a:xfrm>
+          <a:prstGeom prst="rect">
+            <a:avLst/>
+          </a:prstGeom>
+          <a:noFill/>
+        </p:spPr>
+        <p:txBody>
+          <a:bodyPr wrap="none" rtlCol="0">
+            <a:spAutoFit/>
+            <a:scene3d>
+              <a:camera prst="orthographicFront"/>
+              <a:lightRig rig="threePt" dir="t"/>
+            </a:scene3d>
+            <a:sp3d extrusionH="57150">
+              <a:bevelT w="38100" h="38100" prst="angle"/>
+            </a:sp3d>
+          </a:bodyPr>
+          <a:lstStyle/>
+          <a:p>
+            <a:r>
+              <a:rPr lang="en-US" sz="7200" dirty="0" smtClean="0">
+                <a:ln>
+                  <a:solidFill>
+                    <a:schemeClr val="tx1"/>
+                  </a:solidFill>
+                </a:ln>
+                <a:solidFill>
+                  <a:schemeClr val="tx1">
+                    <a:lumMod val="75000"/>
+                    <a:lumOff val="25000"/>
+                  </a:schemeClr>
+                </a:solidFill>
+                <a:latin typeface="Sport 4 Ever" pitchFamily="2" charset="0"/>
+              </a:rPr>
+              <a:t>B</a:t>
+            </a:r>
+            <a:endParaRPr lang="en-US" sz="7200" dirty="0">
+              <a:ln>
+                <a:solidFill>
+                  <a:schemeClr val="tx1"/>
+                </a:solidFill>
+              </a:ln>
+              <a:solidFill>
+                <a:schemeClr val="tx1">
+                  <a:lumMod val="75000"/>
+                  <a:lumOff val="25000"/>
+                </a:schemeClr>
+              </a:solidFill>
+              <a:latin typeface="Sport 4 Ever" pitchFamily="2" charset="0"/>
+            </a:endParaRPr>
+          </a:p>
+        </p:txBody>
+      </p:sp>
+      <p:sp>
+        <p:nvSpPr>
+          <p:cNvPr id="5" name="5-Point Star 4"/>
+          <p:cNvSpPr/>
+          <p:nvPr/>
+        </p:nvSpPr>
+        <p:spPr>
+          <a:xfrm>
+            <a:off x="4088299" y="2382259"/>
+            <a:ext cx="208541" cy="208541"/>
+          </a:xfrm>
+          <a:prstGeom prst="star5">
+            <a:avLst>
+              <a:gd name="adj" fmla="val 23327"/>
+              <a:gd name="hf" fmla="val 105146"/>
+              <a:gd name="vf" fmla="val 110557"/>
+            </a:avLst>
+          </a:prstGeom>
+          <a:solidFill>
+            <a:srgbClr val="FFFF00"/>
+          </a:solidFill>
+          <a:ln w="3175">
+            <a:noFill/>
+          </a:ln>
+          <a:effectLst>
+            <a:outerShdw blurRad="44450" dist="27940" dir="5400000" algn="ctr">
+              <a:srgbClr val="000000">
+                <a:alpha val="32000"/>
+              </a:srgbClr>
+            </a:outerShdw>
+          </a:effectLst>
+          <a:scene3d>
+            <a:camera prst="orthographicFront">
+              <a:rot lat="0" lon="0" rev="0"/>
+            </a:camera>
+            <a:lightRig rig="balanced" dir="t">
+              <a:rot lat="0" lon="0" rev="8700000"/>
+            </a:lightRig>
+          </a:scene3d>
+          <a:sp3d>
+            <a:bevelT w="190500" h="38100"/>
+          </a:sp3d>
+        </p:spPr>
+        <p:style>
+          <a:lnRef idx="2">
+            <a:schemeClr val="accent1">
+              <a:shade val="50000"/>
+            </a:schemeClr>
+          </a:lnRef>
+          <a:fillRef idx="1">
+            <a:schemeClr val="accent1"/>
+          </a:fillRef>
+          <a:effectRef idx="0">
+            <a:schemeClr val="accent1"/>
+          </a:effectRef>
+          <a:fontRef idx="minor">
+            <a:schemeClr val="lt1"/>
+          </a:fontRef>
+        </p:style>
+        <p:txBody>
+          <a:bodyPr rtlCol="0" anchor="ctr"/>
+          <a:lstStyle/>
+          <a:p>
+            <a:pPr algn="ctr"/>
+            <a:endParaRPr lang="en-US"/>
+          </a:p>
+        </p:txBody>
+      </p:sp>
+      <p:sp>
+        <p:nvSpPr>
+          <p:cNvPr id="13" name="5-Point Star 12"/>
+          <p:cNvSpPr/>
+          <p:nvPr/>
+        </p:nvSpPr>
+        <p:spPr>
+          <a:xfrm>
+            <a:off x="3447934" y="2457334"/>
+            <a:ext cx="133466" cy="133466"/>
+          </a:xfrm>
+          <a:prstGeom prst="star5">
+            <a:avLst>
+              <a:gd name="adj" fmla="val 23327"/>
+              <a:gd name="hf" fmla="val 105146"/>
+              <a:gd name="vf" fmla="val 110557"/>
+            </a:avLst>
+          </a:prstGeom>
+          <a:solidFill>
+            <a:srgbClr val="FFFF00"/>
+          </a:solidFill>
+          <a:ln w="3175">
+            <a:noFill/>
+          </a:ln>
+          <a:effectLst>
+            <a:outerShdw blurRad="44450" dist="27940" dir="5400000" algn="ctr">
+              <a:srgbClr val="000000">
+                <a:alpha val="32000"/>
+              </a:srgbClr>
+            </a:outerShdw>
+          </a:effectLst>
+          <a:scene3d>
+            <a:camera prst="orthographicFront">
+              <a:rot lat="0" lon="0" rev="0"/>
+            </a:camera>
+            <a:lightRig rig="balanced" dir="t">
+              <a:rot lat="0" lon="0" rev="8700000"/>
+            </a:lightRig>
+          </a:scene3d>
+          <a:sp3d>
+            <a:bevelT w="190500" h="38100"/>
+          </a:sp3d>
+        </p:spPr>
+        <p:style>
+          <a:lnRef idx="2">
+            <a:schemeClr val="accent1">
+              <a:shade val="50000"/>
+            </a:schemeClr>
+          </a:lnRef>
+          <a:fillRef idx="1">
+            <a:schemeClr val="accent1"/>
+          </a:fillRef>
+          <a:effectRef idx="0">
+            <a:schemeClr val="accent1"/>
+          </a:effectRef>
+          <a:fontRef idx="minor">
+            <a:schemeClr val="lt1"/>
+          </a:fontRef>
+        </p:style>
+        <p:txBody>
+          <a:bodyPr rtlCol="0" anchor="ctr"/>
+          <a:lstStyle/>
+          <a:p>
+            <a:pPr algn="ctr"/>
+            <a:endParaRPr lang="en-US"/>
+          </a:p>
+        </p:txBody>
+      </p:sp>
+      <p:sp>
+        <p:nvSpPr>
+          <p:cNvPr id="14" name="5-Point Star 13"/>
+          <p:cNvSpPr/>
+          <p:nvPr/>
+        </p:nvSpPr>
+        <p:spPr>
+          <a:xfrm>
+            <a:off x="4724400" y="2457334"/>
+            <a:ext cx="133466" cy="133466"/>
+          </a:xfrm>
+          <a:prstGeom prst="star5">
+            <a:avLst>
+              <a:gd name="adj" fmla="val 23327"/>
+              <a:gd name="hf" fmla="val 105146"/>
+              <a:gd name="vf" fmla="val 110557"/>
+            </a:avLst>
+          </a:prstGeom>
+          <a:solidFill>
+            <a:srgbClr val="FFFF00"/>
+          </a:solidFill>
+          <a:ln w="3175">
+            <a:noFill/>
+          </a:ln>
+          <a:effectLst>
+            <a:outerShdw blurRad="44450" dist="27940" dir="5400000" algn="ctr">
+              <a:srgbClr val="000000">
+                <a:alpha val="32000"/>
+              </a:srgbClr>
+            </a:outerShdw>
+          </a:effectLst>
+          <a:scene3d>
+            <a:camera prst="orthographicFront">
+              <a:rot lat="0" lon="0" rev="0"/>
+            </a:camera>
+            <a:lightRig rig="balanced" dir="t">
+              <a:rot lat="0" lon="0" rev="8700000"/>
+            </a:lightRig>
+          </a:scene3d>
+          <a:sp3d>
+            <a:bevelT w="190500" h="38100"/>
+          </a:sp3d>
+        </p:spPr>
+        <p:style>
+          <a:lnRef idx="2">
+            <a:schemeClr val="accent1">
+              <a:shade val="50000"/>
+            </a:schemeClr>
+          </a:lnRef>
+          <a:fillRef idx="1">
+            <a:schemeClr val="accent1"/>
+          </a:fillRef>
+          <a:effectRef idx="0">
+            <a:schemeClr val="accent1"/>
+          </a:effectRef>
+          <a:fontRef idx="minor">
+            <a:schemeClr val="lt1"/>
+          </a:fontRef>
+        </p:style>
+        <p:txBody>
+          <a:bodyPr rtlCol="0" anchor="ctr"/>
+          <a:lstStyle/>
+          <a:p>
+            <a:pPr algn="ctr"/>
+            <a:endParaRPr lang="en-US"/>
+          </a:p>
+        </p:txBody>
+      </p:sp>
+      <p:sp>
+        <p:nvSpPr>
+          <p:cNvPr id="12" name="TextBox 11"/>
+          <p:cNvSpPr txBox="1"/>
+          <p:nvPr/>
+        </p:nvSpPr>
+        <p:spPr>
+          <a:xfrm>
+            <a:off x="4572000" y="1619071"/>
+            <a:ext cx="1093569" cy="1200329"/>
+          </a:xfrm>
+          <a:prstGeom prst="rect">
+            <a:avLst/>
+          </a:prstGeom>
+          <a:noFill/>
+        </p:spPr>
+        <p:txBody>
+          <a:bodyPr wrap="none" rtlCol="0">
+            <a:spAutoFit/>
+            <a:scene3d>
+              <a:camera prst="orthographicFront"/>
+              <a:lightRig rig="threePt" dir="t"/>
+            </a:scene3d>
+            <a:sp3d extrusionH="57150">
+              <a:bevelT w="38100" h="38100" prst="angle"/>
+            </a:sp3d>
+          </a:bodyPr>
+          <a:lstStyle/>
+          <a:p>
+            <a:r>
+              <a:rPr lang="en-US" sz="7200" dirty="0" smtClean="0">
+                <a:ln>
+                  <a:solidFill>
+                    <a:schemeClr val="tx1"/>
+                  </a:solidFill>
+                </a:ln>
+                <a:solidFill>
+                  <a:schemeClr val="tx1">
+                    <a:lumMod val="75000"/>
+                    <a:lumOff val="25000"/>
+                  </a:schemeClr>
+                </a:solidFill>
+                <a:latin typeface="Sport 4 Ever" pitchFamily="2" charset="0"/>
+              </a:rPr>
+              <a:t>C</a:t>
+            </a:r>
+            <a:endParaRPr lang="en-US" sz="7200" dirty="0">
+              <a:ln>
+                <a:solidFill>
+                  <a:schemeClr val="tx1"/>
+                </a:solidFill>
+              </a:ln>
+              <a:solidFill>
+                <a:schemeClr val="tx1">
+                  <a:lumMod val="75000"/>
+                  <a:lumOff val="25000"/>
+                </a:schemeClr>
+              </a:solidFill>
+              <a:latin typeface="Sport 4 Ever" pitchFamily="2" charset="0"/>
+            </a:endParaRPr>
+          </a:p>
+        </p:txBody>
+      </p:sp>
+      <p:sp>
+        <p:nvSpPr>
+          <p:cNvPr id="15" name="5-Point Star 14"/>
+          <p:cNvSpPr/>
+          <p:nvPr/>
+        </p:nvSpPr>
+        <p:spPr>
+          <a:xfrm>
+            <a:off x="4125836" y="3676534"/>
+            <a:ext cx="133466" cy="133466"/>
+          </a:xfrm>
+          <a:prstGeom prst="star5">
+            <a:avLst>
+              <a:gd name="adj" fmla="val 23327"/>
+              <a:gd name="hf" fmla="val 105146"/>
+              <a:gd name="vf" fmla="val 110557"/>
+            </a:avLst>
+          </a:prstGeom>
+          <a:solidFill>
+            <a:srgbClr val="FFFF00"/>
+          </a:solidFill>
+          <a:ln w="3175">
+            <a:noFill/>
+          </a:ln>
+          <a:effectLst>
+            <a:outerShdw blurRad="44450" dist="27940" dir="5400000" algn="ctr">
+              <a:srgbClr val="000000">
+                <a:alpha val="32000"/>
+              </a:srgbClr>
+            </a:outerShdw>
+          </a:effectLst>
+          <a:scene3d>
+            <a:camera prst="orthographicFront">
+              <a:rot lat="0" lon="0" rev="0"/>
+            </a:camera>
+            <a:lightRig rig="balanced" dir="t">
+              <a:rot lat="0" lon="0" rev="8700000"/>
+            </a:lightRig>
+          </a:scene3d>
+          <a:sp3d>
+            <a:bevelT w="190500" h="38100"/>
+          </a:sp3d>
+        </p:spPr>
+        <p:style>
+          <a:lnRef idx="2">
+            <a:schemeClr val="accent1">
+              <a:shade val="50000"/>
+            </a:schemeClr>
+          </a:lnRef>
+          <a:fillRef idx="1">
+            <a:schemeClr val="accent1"/>
+          </a:fillRef>
+          <a:effectRef idx="0">
+            <a:schemeClr val="accent1"/>
+          </a:effectRef>
+          <a:fontRef idx="minor">
+            <a:schemeClr val="lt1"/>
+          </a:fontRef>
+        </p:style>
+        <p:txBody>
+          <a:bodyPr rtlCol="0" anchor="ctr"/>
+          <a:lstStyle/>
+          <a:p>
+            <a:pPr algn="ctr"/>
+            <a:endParaRPr lang="en-US"/>
+          </a:p>
+        </p:txBody>
+      </p:sp>
+    </p:spTree>
+    <p:extLst>
+      <p:ext uri="{BB962C8B-B14F-4D97-AF65-F5344CB8AC3E}">
+        <p14:creationId xmlns:p14="http://schemas.microsoft.com/office/powerpoint/2010/main" val="3226685397"/>
+      </p:ext>
+    </p:extLst>
+  </p:cSld>
+  <p:clrMapOvr>
+    <a:masterClrMapping/>
+  </p:clrMapOvr>
+  <p:timing>
+    <p:tnLst>
+      <p:par>
+        <p:cTn id="1" dur="indefinite" restart="never" nodeType="tmRoot"/>
+      </p:par>
+    </p:tnLst>
+  </p:timing>
+</p:sld>
+</file>
+
+<file path=ppt/slides/slide2.xml><?xml version="1.0" encoding="utf-8"?>
+<p:sld xmlns:a="http://schemas.openxmlformats.org/drawingml/2006/main" xmlns:r="http://schemas.openxmlformats.org/officeDocument/2006/relationships" xmlns:p="http://schemas.openxmlformats.org/presentationml/2006/main">
+  <p:cSld>
+    <p:spTree>
+      <p:nvGrpSpPr>
+        <p:cNvPr id="1" name=""/>
+        <p:cNvGrpSpPr/>
+        <p:nvPr/>
+      </p:nvGrpSpPr>
+      <p:grpSpPr>
+        <a:xfrm>
+          <a:off x="0" y="0"/>
+          <a:ext cx="0" cy="0"/>
+          <a:chOff x="0" y="0"/>
+          <a:chExt cx="0" cy="0"/>
+        </a:xfrm>
+      </p:grpSpPr>
+      <p:sp>
+        <p:nvSpPr>
+          <p:cNvPr id="16" name="12-Point Star 15"/>
+          <p:cNvSpPr/>
+          <p:nvPr/>
+        </p:nvSpPr>
+        <p:spPr>
+          <a:xfrm>
+            <a:off x="3733800" y="1219200"/>
+            <a:ext cx="3810000" cy="2057400"/>
+          </a:xfrm>
+          <a:prstGeom prst="star12">
+            <a:avLst>
+              <a:gd name="adj" fmla="val 40119"/>
+            </a:avLst>
+          </a:prstGeom>
+          <a:solidFill>
+            <a:srgbClr val="007A37"/>
+          </a:solidFill>
+          <a:ln w="12700"/>
+          <a:scene3d>
+            <a:camera prst="orthographicFront"/>
+            <a:lightRig rig="threePt" dir="t"/>
+          </a:scene3d>
+          <a:sp3d>
+            <a:bevelT w="139700" h="139700" prst="divot"/>
+          </a:sp3d>
+        </p:spPr>
+        <p:style>
+          <a:lnRef idx="2">
+            <a:schemeClr val="accent3">
+              <a:shade val="50000"/>
+            </a:schemeClr>
+          </a:lnRef>
+          <a:fillRef idx="1">
+            <a:schemeClr val="accent3"/>
+          </a:fillRef>
+          <a:effectRef idx="0">
+            <a:schemeClr val="accent3"/>
+          </a:effectRef>
+          <a:fontRef idx="minor">
+            <a:schemeClr val="lt1"/>
+          </a:fontRef>
+        </p:style>
+        <p:txBody>
+          <a:bodyPr rtlCol="0" anchor="ctr"/>
+          <a:lstStyle/>
+          <a:p>
+            <a:pPr algn="ctr"/>
+            <a:endParaRPr lang="en-US"/>
+          </a:p>
+        </p:txBody>
+      </p:sp>
+      <p:sp>
+        <p:nvSpPr>
+          <p:cNvPr id="17" name="12-Point Star 16"/>
+          <p:cNvSpPr/>
+          <p:nvPr/>
+        </p:nvSpPr>
+        <p:spPr>
+          <a:xfrm>
+            <a:off x="3886200" y="1315998"/>
+            <a:ext cx="3505200" cy="1920240"/>
+          </a:xfrm>
+          <a:prstGeom prst="star12">
+            <a:avLst>
+              <a:gd name="adj" fmla="val 40119"/>
+            </a:avLst>
+          </a:prstGeom>
+          <a:solidFill>
+            <a:srgbClr val="00B050"/>
+          </a:solidFill>
+          <a:ln w="12700"/>
+          <a:scene3d>
+            <a:camera prst="orthographicFront"/>
+            <a:lightRig rig="threePt" dir="t"/>
+          </a:scene3d>
+          <a:sp3d>
+            <a:bevelT w="139700" h="139700" prst="divot"/>
+          </a:sp3d>
+        </p:spPr>
+        <p:style>
+          <a:lnRef idx="2">
+            <a:schemeClr val="accent3">
+              <a:shade val="50000"/>
+            </a:schemeClr>
+          </a:lnRef>
+          <a:fillRef idx="1">
+            <a:schemeClr val="accent3"/>
+          </a:fillRef>
+          <a:effectRef idx="0">
+            <a:schemeClr val="accent3"/>
+          </a:effectRef>
+          <a:fontRef idx="minor">
+            <a:schemeClr val="lt1"/>
+          </a:fontRef>
+        </p:style>
+        <p:txBody>
+          <a:bodyPr rtlCol="0" anchor="ctr"/>
+          <a:lstStyle/>
+          <a:p>
+            <a:pPr algn="ctr"/>
+            <a:endParaRPr lang="en-US"/>
+          </a:p>
+        </p:txBody>
+      </p:sp>
+      <p:grpSp>
+        <p:nvGrpSpPr>
+          <p:cNvPr id="24" name="Group 23"/>
+          <p:cNvGrpSpPr/>
+          <p:nvPr/>
+        </p:nvGrpSpPr>
+        <p:grpSpPr>
+          <a:xfrm>
+            <a:off x="4343413" y="1600200"/>
+            <a:ext cx="2590774" cy="1261674"/>
+            <a:chOff x="990600" y="2366854"/>
+            <a:chExt cx="2590774" cy="1261674"/>
+          </a:xfrm>
+        </p:grpSpPr>
+        <p:sp>
+          <p:nvSpPr>
+            <p:cNvPr id="4" name="TextBox 3"/>
+            <p:cNvSpPr txBox="1"/>
+            <p:nvPr/>
+          </p:nvSpPr>
+          <p:spPr>
+            <a:xfrm>
+              <a:off x="990600" y="2366854"/>
+              <a:ext cx="2590774" cy="1015663"/>
+            </a:xfrm>
+            <a:prstGeom prst="rect">
+              <a:avLst/>
+            </a:prstGeom>
+            <a:noFill/>
+          </p:spPr>
+          <p:txBody>
+            <a:bodyPr wrap="none" rtlCol="0">
+              <a:spAutoFit/>
+              <a:scene3d>
+                <a:camera prst="orthographicFront"/>
+                <a:lightRig rig="threePt" dir="t"/>
+              </a:scene3d>
+              <a:sp3d extrusionH="57150">
+                <a:bevelT w="38100" h="38100" prst="slope"/>
+              </a:sp3d>
+            </a:bodyPr>
+            <a:lstStyle/>
+            <a:p>
+              <a:pPr algn="ctr"/>
+              <a:r>
+                <a:rPr lang="en-US" sz="6000" dirty="0" smtClean="0">
+                  <a:ln w="9525">
+                    <a:solidFill>
+                      <a:schemeClr val="tx1"/>
+                    </a:solidFill>
+                  </a:ln>
+                  <a:solidFill>
+                    <a:schemeClr val="bg1"/>
+                  </a:solidFill>
+                  <a:effectLst>
+                    <a:glow rad="139700">
+                      <a:schemeClr val="accent3">
+                        <a:satMod val="175000"/>
+                        <a:alpha val="40000"/>
+                      </a:schemeClr>
+                    </a:glow>
+                    <a:innerShdw blurRad="63500" dist="50800" dir="10800000">
+                      <a:prstClr val="black">
+                        <a:alpha val="50000"/>
+                      </a:prstClr>
+                    </a:innerShdw>
+                  </a:effectLst>
+                  <a:latin typeface="Fight Night" panose="02000500000000000000" pitchFamily="2" charset="0"/>
+                </a:rPr>
+                <a:t>SOCCER</a:t>
+              </a:r>
+            </a:p>
+          </p:txBody>
+        </p:sp>
+        <p:sp>
+          <p:nvSpPr>
+            <p:cNvPr id="11" name="TextBox 10"/>
+            <p:cNvSpPr txBox="1"/>
+            <p:nvPr/>
+          </p:nvSpPr>
+          <p:spPr>
+            <a:xfrm>
+              <a:off x="1383336" y="3105308"/>
+              <a:ext cx="1805302" cy="523220"/>
+            </a:xfrm>
+            <a:prstGeom prst="rect">
+              <a:avLst/>
+            </a:prstGeom>
+            <a:noFill/>
+          </p:spPr>
+          <p:txBody>
+            <a:bodyPr wrap="none" rtlCol="0">
+              <a:spAutoFit/>
+            </a:bodyPr>
+            <a:lstStyle/>
+            <a:p>
+              <a:pPr algn="ctr"/>
+              <a:r>
+                <a:rPr lang="en-US" sz="2800" dirty="0" smtClean="0">
+                  <a:ln w="6350">
+                    <a:solidFill>
+                      <a:schemeClr val="accent2">
+                        <a:lumMod val="50000"/>
+                      </a:schemeClr>
+                    </a:solidFill>
+                  </a:ln>
+                  <a:solidFill>
+                    <a:srgbClr val="FF0000"/>
+                  </a:solidFill>
+                  <a:effectLst>
+                    <a:glow rad="228600">
+                      <a:schemeClr val="accent3">
+                        <a:satMod val="175000"/>
+                        <a:alpha val="40000"/>
+                      </a:schemeClr>
+                    </a:glow>
+                  </a:effectLst>
+                  <a:latin typeface="Octin Vintage B Rg" panose="02000506020000020004" pitchFamily="2" charset="0"/>
+                </a:rPr>
+                <a:t>HANGMAN</a:t>
+              </a:r>
+            </a:p>
+          </p:txBody>
+        </p:sp>
+      </p:grpSp>
+      <p:sp>
+        <p:nvSpPr>
+          <p:cNvPr id="2" name="Isosceles Triangle 1"/>
+          <p:cNvSpPr/>
+          <p:nvPr/>
+        </p:nvSpPr>
+        <p:spPr>
+          <a:xfrm rot="16200000">
+            <a:off x="4127598" y="2122194"/>
+            <a:ext cx="123783" cy="307848"/>
+          </a:xfrm>
+          <a:prstGeom prst="triangle">
+            <a:avLst/>
+          </a:prstGeom>
+          <a:solidFill>
+            <a:schemeClr val="bg1"/>
+          </a:solidFill>
+          <a:ln w="12700">
+            <a:noFill/>
+          </a:ln>
+          <a:scene3d>
+            <a:camera prst="orthographicFront"/>
+            <a:lightRig rig="threePt" dir="t"/>
+          </a:scene3d>
+          <a:sp3d>
+            <a:bevelT prst="relaxedInset"/>
+          </a:sp3d>
+        </p:spPr>
+        <p:style>
+          <a:lnRef idx="2">
+            <a:schemeClr val="accent1">
+              <a:shade val="50000"/>
+            </a:schemeClr>
+          </a:lnRef>
+          <a:fillRef idx="1">
+            <a:schemeClr val="accent1"/>
+          </a:fillRef>
+          <a:effectRef idx="0">
+            <a:schemeClr val="accent1"/>
+          </a:effectRef>
+          <a:fontRef idx="minor">
+            <a:schemeClr val="lt1"/>
+          </a:fontRef>
+        </p:style>
+        <p:txBody>
+          <a:bodyPr rtlCol="0" anchor="ctr"/>
+          <a:lstStyle/>
+          <a:p>
+            <a:pPr algn="ctr"/>
+            <a:endParaRPr lang="en-US"/>
+          </a:p>
+        </p:txBody>
+      </p:sp>
+    </p:spTree>
+    <p:extLst>
+      <p:ext uri="{BB962C8B-B14F-4D97-AF65-F5344CB8AC3E}">
+        <p14:creationId xmlns:p14="http://schemas.microsoft.com/office/powerpoint/2010/main" val="4158585292"/>
+      </p:ext>
+    </p:extLst>
+  </p:cSld>
+  <p:clrMapOvr>
+    <a:masterClrMapping/>
+  </p:clrMapOvr>
+  <p:timing>
+    <p:tnLst>
+      <p:par>
+        <p:cTn id="1" dur="indefinite" restart="never" nodeType="tmRoot"/>
+      </p:par>
+    </p:tnLst>
+  </p:timing>
+</p:sld>
+</file>
+
+<file path=ppt/slides/slide3.xml><?xml version="1.0" encoding="utf-8"?>
+<p:sld xmlns:a="http://schemas.openxmlformats.org/drawingml/2006/main" xmlns:r="http://schemas.openxmlformats.org/officeDocument/2006/relationships" xmlns:p="http://schemas.openxmlformats.org/presentationml/2006/main">
+  <p:cSld>
     <p:spTree>
       <p:nvGrpSpPr>
         <p:cNvPr id="1" name=""/>
@@ -3353,721 +4517,13 @@
   <p:clrMapOvr>
     <a:masterClrMapping/>
   </p:clrMapOvr>
-</p:sld>
-</file>
-
-<file path=ppt/slides/slide2.xml><?xml version="1.0" encoding="utf-8"?>
-<p:sld xmlns:a="http://schemas.openxmlformats.org/drawingml/2006/main" xmlns:r="http://schemas.openxmlformats.org/officeDocument/2006/relationships" xmlns:p="http://schemas.openxmlformats.org/presentationml/2006/main">
-  <p:cSld>
-    <p:spTree>
-      <p:nvGrpSpPr>
-        <p:cNvPr id="1" name=""/>
-        <p:cNvGrpSpPr/>
-        <p:nvPr/>
-      </p:nvGrpSpPr>
-      <p:grpSpPr>
-        <a:xfrm>
-          <a:off x="0" y="0"/>
-          <a:ext cx="0" cy="0"/>
-          <a:chOff x="0" y="0"/>
-          <a:chExt cx="0" cy="0"/>
-        </a:xfrm>
-      </p:grpSpPr>
-      <p:sp>
-        <p:nvSpPr>
-          <p:cNvPr id="16" name="12-Point Star 15"/>
-          <p:cNvSpPr/>
-          <p:nvPr/>
-        </p:nvSpPr>
-        <p:spPr>
-          <a:xfrm>
-            <a:off x="2287570" y="2060942"/>
-            <a:ext cx="3810000" cy="2057400"/>
-          </a:xfrm>
-          <a:prstGeom prst="star12">
-            <a:avLst>
-              <a:gd name="adj" fmla="val 40119"/>
-            </a:avLst>
-          </a:prstGeom>
-          <a:solidFill>
-            <a:srgbClr val="007A37"/>
-          </a:solidFill>
-          <a:ln w="12700"/>
-          <a:scene3d>
-            <a:camera prst="orthographicFront"/>
-            <a:lightRig rig="threePt" dir="t"/>
-          </a:scene3d>
-          <a:sp3d>
-            <a:bevelT w="139700" h="139700" prst="divot"/>
-          </a:sp3d>
-        </p:spPr>
-        <p:style>
-          <a:lnRef idx="2">
-            <a:schemeClr val="accent3">
-              <a:shade val="50000"/>
-            </a:schemeClr>
-          </a:lnRef>
-          <a:fillRef idx="1">
-            <a:schemeClr val="accent3"/>
-          </a:fillRef>
-          <a:effectRef idx="0">
-            <a:schemeClr val="accent3"/>
-          </a:effectRef>
-          <a:fontRef idx="minor">
-            <a:schemeClr val="lt1"/>
-          </a:fontRef>
-        </p:style>
-        <p:txBody>
-          <a:bodyPr rtlCol="0" anchor="ctr"/>
-          <a:lstStyle/>
-          <a:p>
-            <a:pPr algn="ctr"/>
-            <a:endParaRPr lang="en-US"/>
-          </a:p>
-        </p:txBody>
-      </p:sp>
-      <p:sp>
-        <p:nvSpPr>
-          <p:cNvPr id="17" name="12-Point Star 16"/>
-          <p:cNvSpPr/>
-          <p:nvPr/>
-        </p:nvSpPr>
-        <p:spPr>
-          <a:xfrm>
-            <a:off x="2439970" y="2157740"/>
-            <a:ext cx="3505200" cy="1920240"/>
-          </a:xfrm>
-          <a:prstGeom prst="star12">
-            <a:avLst>
-              <a:gd name="adj" fmla="val 40119"/>
-            </a:avLst>
-          </a:prstGeom>
-          <a:solidFill>
-            <a:srgbClr val="00B050"/>
-          </a:solidFill>
-          <a:ln w="12700"/>
-          <a:scene3d>
-            <a:camera prst="orthographicFront"/>
-            <a:lightRig rig="threePt" dir="t"/>
-          </a:scene3d>
-          <a:sp3d>
-            <a:bevelT w="139700" h="139700" prst="divot"/>
-          </a:sp3d>
-        </p:spPr>
-        <p:style>
-          <a:lnRef idx="2">
-            <a:schemeClr val="accent3">
-              <a:shade val="50000"/>
-            </a:schemeClr>
-          </a:lnRef>
-          <a:fillRef idx="1">
-            <a:schemeClr val="accent3"/>
-          </a:fillRef>
-          <a:effectRef idx="0">
-            <a:schemeClr val="accent3"/>
-          </a:effectRef>
-          <a:fontRef idx="minor">
-            <a:schemeClr val="lt1"/>
-          </a:fontRef>
-        </p:style>
-        <p:txBody>
-          <a:bodyPr rtlCol="0" anchor="ctr"/>
-          <a:lstStyle/>
-          <a:p>
-            <a:pPr algn="ctr"/>
-            <a:endParaRPr lang="en-US"/>
-          </a:p>
-        </p:txBody>
-      </p:sp>
-      <p:grpSp>
-        <p:nvGrpSpPr>
-          <p:cNvPr id="24" name="Group 23"/>
-          <p:cNvGrpSpPr/>
-          <p:nvPr/>
-        </p:nvGrpSpPr>
-        <p:grpSpPr>
-          <a:xfrm>
-            <a:off x="2897183" y="2441942"/>
-            <a:ext cx="2590774" cy="1261674"/>
-            <a:chOff x="990600" y="2366854"/>
-            <a:chExt cx="2590774" cy="1261674"/>
-          </a:xfrm>
-        </p:grpSpPr>
-        <p:sp>
-          <p:nvSpPr>
-            <p:cNvPr id="11" name="TextBox 10"/>
-            <p:cNvSpPr txBox="1"/>
-            <p:nvPr/>
-          </p:nvSpPr>
-          <p:spPr>
-            <a:xfrm>
-              <a:off x="1383336" y="3105308"/>
-              <a:ext cx="1805302" cy="523220"/>
-            </a:xfrm>
-            <a:prstGeom prst="rect">
-              <a:avLst/>
-            </a:prstGeom>
-            <a:noFill/>
-          </p:spPr>
-          <p:txBody>
-            <a:bodyPr wrap="none" rtlCol="0">
-              <a:spAutoFit/>
-            </a:bodyPr>
-            <a:lstStyle/>
-            <a:p>
-              <a:pPr algn="ctr"/>
-              <a:r>
-                <a:rPr lang="en-US" sz="2800" dirty="0" smtClean="0">
-                  <a:ln w="6350">
-                    <a:solidFill>
-                      <a:schemeClr val="accent2">
-                        <a:lumMod val="50000"/>
-                      </a:schemeClr>
-                    </a:solidFill>
-                  </a:ln>
-                  <a:solidFill>
-                    <a:srgbClr val="FF0000"/>
-                  </a:solidFill>
-                  <a:effectLst>
-                    <a:glow rad="228600">
-                      <a:schemeClr val="accent3">
-                        <a:satMod val="175000"/>
-                        <a:alpha val="40000"/>
-                      </a:schemeClr>
-                    </a:glow>
-                  </a:effectLst>
-                  <a:latin typeface="Octin Vintage B Rg" panose="02000506020000020004" pitchFamily="2" charset="0"/>
-                </a:rPr>
-                <a:t>HANGMAN</a:t>
-              </a:r>
-            </a:p>
-          </p:txBody>
-        </p:sp>
-        <p:sp>
-          <p:nvSpPr>
-            <p:cNvPr id="4" name="TextBox 3"/>
-            <p:cNvSpPr txBox="1"/>
-            <p:nvPr/>
-          </p:nvSpPr>
-          <p:spPr>
-            <a:xfrm>
-              <a:off x="990600" y="2366854"/>
-              <a:ext cx="2590774" cy="1015663"/>
-            </a:xfrm>
-            <a:prstGeom prst="rect">
-              <a:avLst/>
-            </a:prstGeom>
-            <a:noFill/>
-          </p:spPr>
-          <p:txBody>
-            <a:bodyPr wrap="none" rtlCol="0">
-              <a:spAutoFit/>
-              <a:scene3d>
-                <a:camera prst="orthographicFront"/>
-                <a:lightRig rig="threePt" dir="t"/>
-              </a:scene3d>
-              <a:sp3d extrusionH="57150">
-                <a:bevelT w="38100" h="38100" prst="slope"/>
-              </a:sp3d>
-            </a:bodyPr>
-            <a:lstStyle/>
-            <a:p>
-              <a:pPr algn="ctr"/>
-              <a:r>
-                <a:rPr lang="en-US" sz="6000" dirty="0" smtClean="0">
-                  <a:ln w="9525">
-                    <a:solidFill>
-                      <a:schemeClr val="tx1"/>
-                    </a:solidFill>
-                  </a:ln>
-                  <a:solidFill>
-                    <a:schemeClr val="bg1"/>
-                  </a:solidFill>
-                  <a:effectLst>
-                    <a:glow rad="139700">
-                      <a:schemeClr val="accent3">
-                        <a:satMod val="175000"/>
-                        <a:alpha val="40000"/>
-                      </a:schemeClr>
-                    </a:glow>
-                    <a:innerShdw blurRad="63500" dist="50800" dir="10800000">
-                      <a:prstClr val="black">
-                        <a:alpha val="50000"/>
-                      </a:prstClr>
-                    </a:innerShdw>
-                  </a:effectLst>
-                  <a:latin typeface="Fight Night" panose="02000500000000000000" pitchFamily="2" charset="0"/>
-                </a:rPr>
-                <a:t>SOCCER</a:t>
-              </a:r>
-            </a:p>
-          </p:txBody>
-        </p:sp>
-      </p:grpSp>
-      <p:sp>
-        <p:nvSpPr>
-          <p:cNvPr id="2" name="Isosceles Triangle 1"/>
-          <p:cNvSpPr/>
-          <p:nvPr/>
-        </p:nvSpPr>
-        <p:spPr>
-          <a:xfrm rot="16200000">
-            <a:off x="2567008" y="2908309"/>
-            <a:ext cx="123782" cy="381001"/>
-          </a:xfrm>
-          <a:prstGeom prst="triangle">
-            <a:avLst/>
-          </a:prstGeom>
-          <a:solidFill>
-            <a:srgbClr val="FFFF00"/>
-          </a:solidFill>
-          <a:ln w="12700">
-            <a:noFill/>
-          </a:ln>
-          <a:scene3d>
-            <a:camera prst="orthographicFront"/>
-            <a:lightRig rig="threePt" dir="t"/>
-          </a:scene3d>
-          <a:sp3d>
-            <a:bevelT prst="angle"/>
-          </a:sp3d>
-        </p:spPr>
-        <p:style>
-          <a:lnRef idx="2">
-            <a:schemeClr val="accent1">
-              <a:shade val="50000"/>
-            </a:schemeClr>
-          </a:lnRef>
-          <a:fillRef idx="1">
-            <a:schemeClr val="accent1"/>
-          </a:fillRef>
-          <a:effectRef idx="0">
-            <a:schemeClr val="accent1"/>
-          </a:effectRef>
-          <a:fontRef idx="minor">
-            <a:schemeClr val="lt1"/>
-          </a:fontRef>
-        </p:style>
-        <p:txBody>
-          <a:bodyPr rtlCol="0" anchor="ctr"/>
-          <a:lstStyle/>
-          <a:p>
-            <a:pPr algn="ctr"/>
-            <a:endParaRPr lang="en-US"/>
-          </a:p>
-        </p:txBody>
-      </p:sp>
-      <p:sp>
-        <p:nvSpPr>
-          <p:cNvPr id="9" name="Isosceles Triangle 8"/>
-          <p:cNvSpPr/>
-          <p:nvPr/>
-        </p:nvSpPr>
-        <p:spPr>
-          <a:xfrm rot="5400000" flipH="1">
-            <a:off x="5691210" y="2903883"/>
-            <a:ext cx="123782" cy="381001"/>
-          </a:xfrm>
-          <a:prstGeom prst="triangle">
-            <a:avLst/>
-          </a:prstGeom>
-          <a:solidFill>
-            <a:srgbClr val="FFFF00"/>
-          </a:solidFill>
-          <a:ln w="12700">
-            <a:noFill/>
-          </a:ln>
-          <a:scene3d>
-            <a:camera prst="orthographicFront"/>
-            <a:lightRig rig="threePt" dir="t"/>
-          </a:scene3d>
-          <a:sp3d>
-            <a:bevelT prst="angle"/>
-          </a:sp3d>
-        </p:spPr>
-        <p:style>
-          <a:lnRef idx="2">
-            <a:schemeClr val="accent1">
-              <a:shade val="50000"/>
-            </a:schemeClr>
-          </a:lnRef>
-          <a:fillRef idx="1">
-            <a:schemeClr val="accent1"/>
-          </a:fillRef>
-          <a:effectRef idx="0">
-            <a:schemeClr val="accent1"/>
-          </a:effectRef>
-          <a:fontRef idx="minor">
-            <a:schemeClr val="lt1"/>
-          </a:fontRef>
-        </p:style>
-        <p:txBody>
-          <a:bodyPr rtlCol="0" anchor="ctr"/>
-          <a:lstStyle/>
-          <a:p>
-            <a:pPr algn="ctr"/>
-            <a:endParaRPr lang="en-US"/>
-          </a:p>
-        </p:txBody>
-      </p:sp>
-      <p:sp>
-        <p:nvSpPr>
-          <p:cNvPr id="3" name="TextBox 2"/>
-          <p:cNvSpPr txBox="1"/>
-          <p:nvPr/>
-        </p:nvSpPr>
-        <p:spPr>
-          <a:xfrm>
-            <a:off x="3354370" y="1267926"/>
-            <a:ext cx="1446230" cy="1631216"/>
-          </a:xfrm>
-          <a:prstGeom prst="rect">
-            <a:avLst/>
-          </a:prstGeom>
-          <a:noFill/>
-        </p:spPr>
-        <p:txBody>
-          <a:bodyPr wrap="none" rtlCol="0">
-            <a:spAutoFit/>
-          </a:bodyPr>
-          <a:lstStyle/>
-          <a:p>
-            <a:r>
-              <a:rPr lang="en-US" sz="9600" dirty="0" smtClean="0">
-                <a:latin typeface="Sport 4 Ever" pitchFamily="2" charset="0"/>
-              </a:rPr>
-              <a:t>C</a:t>
-            </a:r>
-            <a:endParaRPr lang="en-US" sz="9600" dirty="0">
-              <a:latin typeface="Sport 4 Ever" pitchFamily="2" charset="0"/>
-            </a:endParaRPr>
-          </a:p>
-        </p:txBody>
-      </p:sp>
-    </p:spTree>
-    <p:extLst>
-      <p:ext uri="{BB962C8B-B14F-4D97-AF65-F5344CB8AC3E}">
-        <p14:creationId xmlns:p14="http://schemas.microsoft.com/office/powerpoint/2010/main" val="3226685397"/>
-      </p:ext>
-    </p:extLst>
-  </p:cSld>
-  <p:clrMapOvr>
-    <a:masterClrMapping/>
-  </p:clrMapOvr>
-</p:sld>
-</file>
-
-<file path=ppt/slides/slide3.xml><?xml version="1.0" encoding="utf-8"?>
-<p:sld xmlns:a="http://schemas.openxmlformats.org/drawingml/2006/main" xmlns:r="http://schemas.openxmlformats.org/officeDocument/2006/relationships" xmlns:p="http://schemas.openxmlformats.org/presentationml/2006/main">
-  <p:cSld>
-    <p:spTree>
-      <p:nvGrpSpPr>
-        <p:cNvPr id="1" name=""/>
-        <p:cNvGrpSpPr/>
-        <p:nvPr/>
-      </p:nvGrpSpPr>
-      <p:grpSpPr>
-        <a:xfrm>
-          <a:off x="0" y="0"/>
-          <a:ext cx="0" cy="0"/>
-          <a:chOff x="0" y="0"/>
-          <a:chExt cx="0" cy="0"/>
-        </a:xfrm>
-      </p:grpSpPr>
-      <p:sp>
-        <p:nvSpPr>
-          <p:cNvPr id="16" name="12-Point Star 15"/>
-          <p:cNvSpPr/>
-          <p:nvPr/>
-        </p:nvSpPr>
-        <p:spPr>
-          <a:xfrm>
-            <a:off x="3733800" y="1219200"/>
-            <a:ext cx="3810000" cy="2057400"/>
-          </a:xfrm>
-          <a:prstGeom prst="star12">
-            <a:avLst>
-              <a:gd name="adj" fmla="val 40119"/>
-            </a:avLst>
-          </a:prstGeom>
-          <a:solidFill>
-            <a:srgbClr val="007A37"/>
-          </a:solidFill>
-          <a:ln w="12700"/>
-          <a:scene3d>
-            <a:camera prst="orthographicFront"/>
-            <a:lightRig rig="threePt" dir="t"/>
-          </a:scene3d>
-          <a:sp3d>
-            <a:bevelT w="139700" h="139700" prst="divot"/>
-          </a:sp3d>
-        </p:spPr>
-        <p:style>
-          <a:lnRef idx="2">
-            <a:schemeClr val="accent3">
-              <a:shade val="50000"/>
-            </a:schemeClr>
-          </a:lnRef>
-          <a:fillRef idx="1">
-            <a:schemeClr val="accent3"/>
-          </a:fillRef>
-          <a:effectRef idx="0">
-            <a:schemeClr val="accent3"/>
-          </a:effectRef>
-          <a:fontRef idx="minor">
-            <a:schemeClr val="lt1"/>
-          </a:fontRef>
-        </p:style>
-        <p:txBody>
-          <a:bodyPr rtlCol="0" anchor="ctr"/>
-          <a:lstStyle/>
-          <a:p>
-            <a:pPr algn="ctr"/>
-            <a:endParaRPr lang="en-US"/>
-          </a:p>
-        </p:txBody>
-      </p:sp>
-      <p:sp>
-        <p:nvSpPr>
-          <p:cNvPr id="17" name="12-Point Star 16"/>
-          <p:cNvSpPr/>
-          <p:nvPr/>
-        </p:nvSpPr>
-        <p:spPr>
-          <a:xfrm>
-            <a:off x="3886200" y="1315998"/>
-            <a:ext cx="3505200" cy="1920240"/>
-          </a:xfrm>
-          <a:prstGeom prst="star12">
-            <a:avLst>
-              <a:gd name="adj" fmla="val 40119"/>
-            </a:avLst>
-          </a:prstGeom>
-          <a:solidFill>
-            <a:srgbClr val="00B050"/>
-          </a:solidFill>
-          <a:ln w="12700"/>
-          <a:scene3d>
-            <a:camera prst="orthographicFront"/>
-            <a:lightRig rig="threePt" dir="t"/>
-          </a:scene3d>
-          <a:sp3d>
-            <a:bevelT w="139700" h="139700" prst="divot"/>
-          </a:sp3d>
-        </p:spPr>
-        <p:style>
-          <a:lnRef idx="2">
-            <a:schemeClr val="accent3">
-              <a:shade val="50000"/>
-            </a:schemeClr>
-          </a:lnRef>
-          <a:fillRef idx="1">
-            <a:schemeClr val="accent3"/>
-          </a:fillRef>
-          <a:effectRef idx="0">
-            <a:schemeClr val="accent3"/>
-          </a:effectRef>
-          <a:fontRef idx="minor">
-            <a:schemeClr val="lt1"/>
-          </a:fontRef>
-        </p:style>
-        <p:txBody>
-          <a:bodyPr rtlCol="0" anchor="ctr"/>
-          <a:lstStyle/>
-          <a:p>
-            <a:pPr algn="ctr"/>
-            <a:endParaRPr lang="en-US"/>
-          </a:p>
-        </p:txBody>
-      </p:sp>
-      <p:grpSp>
-        <p:nvGrpSpPr>
-          <p:cNvPr id="24" name="Group 23"/>
-          <p:cNvGrpSpPr/>
-          <p:nvPr/>
-        </p:nvGrpSpPr>
-        <p:grpSpPr>
-          <a:xfrm>
-            <a:off x="4343413" y="1600200"/>
-            <a:ext cx="2590774" cy="1261674"/>
-            <a:chOff x="990600" y="2366854"/>
-            <a:chExt cx="2590774" cy="1261674"/>
-          </a:xfrm>
-        </p:grpSpPr>
-        <p:sp>
-          <p:nvSpPr>
-            <p:cNvPr id="4" name="TextBox 3"/>
-            <p:cNvSpPr txBox="1"/>
-            <p:nvPr/>
-          </p:nvSpPr>
-          <p:spPr>
-            <a:xfrm>
-              <a:off x="990600" y="2366854"/>
-              <a:ext cx="2590774" cy="1015663"/>
-            </a:xfrm>
-            <a:prstGeom prst="rect">
-              <a:avLst/>
-            </a:prstGeom>
-            <a:noFill/>
-          </p:spPr>
-          <p:txBody>
-            <a:bodyPr wrap="none" rtlCol="0">
-              <a:spAutoFit/>
-              <a:scene3d>
-                <a:camera prst="orthographicFront"/>
-                <a:lightRig rig="threePt" dir="t"/>
-              </a:scene3d>
-              <a:sp3d extrusionH="57150">
-                <a:bevelT w="38100" h="38100" prst="slope"/>
-              </a:sp3d>
-            </a:bodyPr>
-            <a:lstStyle/>
-            <a:p>
-              <a:pPr algn="ctr"/>
-              <a:r>
-                <a:rPr lang="en-US" sz="6000" dirty="0" smtClean="0">
-                  <a:ln w="9525">
-                    <a:solidFill>
-                      <a:schemeClr val="tx1"/>
-                    </a:solidFill>
-                  </a:ln>
-                  <a:solidFill>
-                    <a:schemeClr val="bg1"/>
-                  </a:solidFill>
-                  <a:effectLst>
-                    <a:glow rad="139700">
-                      <a:schemeClr val="accent3">
-                        <a:satMod val="175000"/>
-                        <a:alpha val="40000"/>
-                      </a:schemeClr>
-                    </a:glow>
-                    <a:innerShdw blurRad="63500" dist="50800" dir="10800000">
-                      <a:prstClr val="black">
-                        <a:alpha val="50000"/>
-                      </a:prstClr>
-                    </a:innerShdw>
-                  </a:effectLst>
-                  <a:latin typeface="Fight Night" panose="02000500000000000000" pitchFamily="2" charset="0"/>
-                </a:rPr>
-                <a:t>SOCCER</a:t>
-              </a:r>
-            </a:p>
-          </p:txBody>
-        </p:sp>
-        <p:sp>
-          <p:nvSpPr>
-            <p:cNvPr id="11" name="TextBox 10"/>
-            <p:cNvSpPr txBox="1"/>
-            <p:nvPr/>
-          </p:nvSpPr>
-          <p:spPr>
-            <a:xfrm>
-              <a:off x="1383336" y="3105308"/>
-              <a:ext cx="1805302" cy="523220"/>
-            </a:xfrm>
-            <a:prstGeom prst="rect">
-              <a:avLst/>
-            </a:prstGeom>
-            <a:noFill/>
-          </p:spPr>
-          <p:txBody>
-            <a:bodyPr wrap="none" rtlCol="0">
-              <a:spAutoFit/>
-            </a:bodyPr>
-            <a:lstStyle/>
-            <a:p>
-              <a:pPr algn="ctr"/>
-              <a:r>
-                <a:rPr lang="en-US" sz="2800" dirty="0" smtClean="0">
-                  <a:ln w="6350">
-                    <a:solidFill>
-                      <a:schemeClr val="accent2">
-                        <a:lumMod val="50000"/>
-                      </a:schemeClr>
-                    </a:solidFill>
-                  </a:ln>
-                  <a:solidFill>
-                    <a:srgbClr val="FF0000"/>
-                  </a:solidFill>
-                  <a:effectLst>
-                    <a:glow rad="228600">
-                      <a:schemeClr val="accent3">
-                        <a:satMod val="175000"/>
-                        <a:alpha val="40000"/>
-                      </a:schemeClr>
-                    </a:glow>
-                  </a:effectLst>
-                  <a:latin typeface="Octin Vintage B Rg" panose="02000506020000020004" pitchFamily="2" charset="0"/>
-                </a:rPr>
-                <a:t>HANGMAN</a:t>
-              </a:r>
-            </a:p>
-          </p:txBody>
-        </p:sp>
-      </p:grpSp>
-      <p:sp>
-        <p:nvSpPr>
-          <p:cNvPr id="2" name="Isosceles Triangle 1"/>
-          <p:cNvSpPr/>
-          <p:nvPr/>
-        </p:nvSpPr>
-        <p:spPr>
-          <a:xfrm rot="16200000">
-            <a:off x="4127598" y="2122194"/>
-            <a:ext cx="123783" cy="307848"/>
-          </a:xfrm>
-          <a:prstGeom prst="triangle">
-            <a:avLst/>
-          </a:prstGeom>
-          <a:solidFill>
-            <a:schemeClr val="bg1"/>
-          </a:solidFill>
-          <a:ln w="12700">
-            <a:noFill/>
-          </a:ln>
-          <a:scene3d>
-            <a:camera prst="orthographicFront"/>
-            <a:lightRig rig="threePt" dir="t"/>
-          </a:scene3d>
-          <a:sp3d>
-            <a:bevelT prst="relaxedInset"/>
-          </a:sp3d>
-        </p:spPr>
-        <p:style>
-          <a:lnRef idx="2">
-            <a:schemeClr val="accent1">
-              <a:shade val="50000"/>
-            </a:schemeClr>
-          </a:lnRef>
-          <a:fillRef idx="1">
-            <a:schemeClr val="accent1"/>
-          </a:fillRef>
-          <a:effectRef idx="0">
-            <a:schemeClr val="accent1"/>
-          </a:effectRef>
-          <a:fontRef idx="minor">
-            <a:schemeClr val="lt1"/>
-          </a:fontRef>
-        </p:style>
-        <p:txBody>
-          <a:bodyPr rtlCol="0" anchor="ctr"/>
-          <a:lstStyle/>
-          <a:p>
-            <a:pPr algn="ctr"/>
-            <a:endParaRPr lang="en-US"/>
-          </a:p>
-        </p:txBody>
-      </p:sp>
-    </p:spTree>
-    <p:extLst>
-      <p:ext uri="{BB962C8B-B14F-4D97-AF65-F5344CB8AC3E}">
-        <p14:creationId xmlns:p14="http://schemas.microsoft.com/office/powerpoint/2010/main" val="4158585292"/>
-      </p:ext>
-    </p:extLst>
-  </p:cSld>
-  <p:clrMapOvr>
-    <a:masterClrMapping/>
-  </p:clrMapOvr>
+  <p:timing>
+    <p:tnLst>
+      <p:par>
+        <p:cTn id="1" dur="indefinite" restart="never" nodeType="tmRoot"/>
+      </p:par>
+    </p:tnLst>
+  </p:timing>
 </p:sld>
 </file>
 

</xml_diff>